<commit_message>
upload 13 and fix 12
</commit_message>
<xml_diff>
--- a/Chapter12_nishijima.pptx
+++ b/Chapter12_nishijima.pptx
@@ -274,7 +274,7 @@
           <a:p>
             <a:fld id="{4A33D202-EF21-4C89-86DA-1EA9AE0DAC9E}" type="datetimeFigureOut">
               <a:rPr kumimoji="1" lang="ja-JP" altLang="en-US" smtClean="0"/>
-              <a:t>2021/7/2</a:t>
+              <a:t>2021/7/5</a:t>
             </a:fld>
             <a:endParaRPr kumimoji="1" lang="ja-JP" altLang="en-US"/>
           </a:p>
@@ -504,7 +504,7 @@
           <a:p>
             <a:fld id="{4A33D202-EF21-4C89-86DA-1EA9AE0DAC9E}" type="datetimeFigureOut">
               <a:rPr kumimoji="1" lang="ja-JP" altLang="en-US" smtClean="0"/>
-              <a:t>2021/7/2</a:t>
+              <a:t>2021/7/5</a:t>
             </a:fld>
             <a:endParaRPr kumimoji="1" lang="ja-JP" altLang="en-US"/>
           </a:p>
@@ -744,7 +744,7 @@
           <a:p>
             <a:fld id="{4A33D202-EF21-4C89-86DA-1EA9AE0DAC9E}" type="datetimeFigureOut">
               <a:rPr kumimoji="1" lang="ja-JP" altLang="en-US" smtClean="0"/>
-              <a:t>2021/7/2</a:t>
+              <a:t>2021/7/5</a:t>
             </a:fld>
             <a:endParaRPr kumimoji="1" lang="ja-JP" altLang="en-US"/>
           </a:p>
@@ -974,7 +974,7 @@
           <a:p>
             <a:fld id="{4A33D202-EF21-4C89-86DA-1EA9AE0DAC9E}" type="datetimeFigureOut">
               <a:rPr kumimoji="1" lang="ja-JP" altLang="en-US" smtClean="0"/>
-              <a:t>2021/7/2</a:t>
+              <a:t>2021/7/5</a:t>
             </a:fld>
             <a:endParaRPr kumimoji="1" lang="ja-JP" altLang="en-US"/>
           </a:p>
@@ -1249,7 +1249,7 @@
           <a:p>
             <a:fld id="{4A33D202-EF21-4C89-86DA-1EA9AE0DAC9E}" type="datetimeFigureOut">
               <a:rPr kumimoji="1" lang="ja-JP" altLang="en-US" smtClean="0"/>
-              <a:t>2021/7/2</a:t>
+              <a:t>2021/7/5</a:t>
             </a:fld>
             <a:endParaRPr kumimoji="1" lang="ja-JP" altLang="en-US"/>
           </a:p>
@@ -1578,7 +1578,7 @@
           <a:p>
             <a:fld id="{4A33D202-EF21-4C89-86DA-1EA9AE0DAC9E}" type="datetimeFigureOut">
               <a:rPr kumimoji="1" lang="ja-JP" altLang="en-US" smtClean="0"/>
-              <a:t>2021/7/2</a:t>
+              <a:t>2021/7/5</a:t>
             </a:fld>
             <a:endParaRPr kumimoji="1" lang="ja-JP" altLang="en-US"/>
           </a:p>
@@ -2054,7 +2054,7 @@
           <a:p>
             <a:fld id="{4A33D202-EF21-4C89-86DA-1EA9AE0DAC9E}" type="datetimeFigureOut">
               <a:rPr kumimoji="1" lang="ja-JP" altLang="en-US" smtClean="0"/>
-              <a:t>2021/7/2</a:t>
+              <a:t>2021/7/5</a:t>
             </a:fld>
             <a:endParaRPr kumimoji="1" lang="ja-JP" altLang="en-US"/>
           </a:p>
@@ -2195,7 +2195,7 @@
           <a:p>
             <a:fld id="{4A33D202-EF21-4C89-86DA-1EA9AE0DAC9E}" type="datetimeFigureOut">
               <a:rPr kumimoji="1" lang="ja-JP" altLang="en-US" smtClean="0"/>
-              <a:t>2021/7/2</a:t>
+              <a:t>2021/7/5</a:t>
             </a:fld>
             <a:endParaRPr kumimoji="1" lang="ja-JP" altLang="en-US"/>
           </a:p>
@@ -2308,7 +2308,7 @@
           <a:p>
             <a:fld id="{4A33D202-EF21-4C89-86DA-1EA9AE0DAC9E}" type="datetimeFigureOut">
               <a:rPr kumimoji="1" lang="ja-JP" altLang="en-US" smtClean="0"/>
-              <a:t>2021/7/2</a:t>
+              <a:t>2021/7/5</a:t>
             </a:fld>
             <a:endParaRPr kumimoji="1" lang="ja-JP" altLang="en-US"/>
           </a:p>
@@ -2651,7 +2651,7 @@
           <a:p>
             <a:fld id="{4A33D202-EF21-4C89-86DA-1EA9AE0DAC9E}" type="datetimeFigureOut">
               <a:rPr kumimoji="1" lang="ja-JP" altLang="en-US" smtClean="0"/>
-              <a:t>2021/7/2</a:t>
+              <a:t>2021/7/5</a:t>
             </a:fld>
             <a:endParaRPr kumimoji="1" lang="ja-JP" altLang="en-US"/>
           </a:p>
@@ -2939,7 +2939,7 @@
           <a:p>
             <a:fld id="{4A33D202-EF21-4C89-86DA-1EA9AE0DAC9E}" type="datetimeFigureOut">
               <a:rPr kumimoji="1" lang="ja-JP" altLang="en-US" smtClean="0"/>
-              <a:t>2021/7/2</a:t>
+              <a:t>2021/7/5</a:t>
             </a:fld>
             <a:endParaRPr kumimoji="1" lang="ja-JP" altLang="en-US"/>
           </a:p>
@@ -3212,7 +3212,7 @@
           <a:p>
             <a:fld id="{4A33D202-EF21-4C89-86DA-1EA9AE0DAC9E}" type="datetimeFigureOut">
               <a:rPr kumimoji="1" lang="ja-JP" altLang="en-US" smtClean="0"/>
-              <a:t>2021/7/2</a:t>
+              <a:t>2021/7/5</a:t>
             </a:fld>
             <a:endParaRPr kumimoji="1" lang="ja-JP" altLang="en-US"/>
           </a:p>
@@ -3735,7 +3735,7 @@
             <a:pPr algn="r"/>
             <a:r>
               <a:rPr lang="en-US" altLang="ja-JP" sz="2000" dirty="0"/>
-              <a:t>2021/05/31</a:t>
+              <a:t>2021/07/05</a:t>
             </a:r>
           </a:p>
           <a:p>
@@ -8002,7 +8002,7 @@
                   <a:srgbClr val="FF0000"/>
                 </a:solidFill>
               </a:rPr>
-              <a:t>種数時間曲線</a:t>
+              <a:t>共存時間曲線</a:t>
             </a:r>
             <a:r>
               <a:rPr lang="ja-JP" altLang="en-US" dirty="0"/>
@@ -8014,7 +8014,7 @@
             </a:r>
             <a:r>
               <a:rPr lang="ja-JP" altLang="en-US" dirty="0"/>
-              <a:t>切片）と時間の感覚の増加とともに増加する共存種数に分けられる</a:t>
+              <a:t>切片）と時間の間隔の増加とともに増加する共存種数に分けられる</a:t>
             </a:r>
             <a:endParaRPr lang="en-US" altLang="ja-JP" dirty="0"/>
           </a:p>
@@ -8223,7 +8223,7 @@
             </a:pPr>
             <a:r>
               <a:rPr lang="ja-JP" altLang="en-US" sz="2000" dirty="0"/>
-              <a:t>種数時間曲線で考慮していないことと関連する問い</a:t>
+              <a:t>共存時間曲線で考慮していないことと関連する問い</a:t>
             </a:r>
             <a:endParaRPr lang="en-US" altLang="ja-JP" sz="2000" dirty="0"/>
           </a:p>

</xml_diff>